<commit_message>
Replace TechWise_Team_4_-_Project_1_Proposal.pptx with updated version. Updated MVP to match the current plan.
</commit_message>
<xml_diff>
--- a/TechWise_Team_4_-_Project_1_Proposal.pptx
+++ b/TechWise_Team_4_-_Project_1_Proposal.pptx
@@ -119,7 +119,7 @@
 <file path=ppt/revisionInfo.xml><?xml version="1.0" encoding="utf-8"?>
 <p1510:revInfo xmlns:a="http://schemas.openxmlformats.org/drawingml/2006/main" xmlns:r="http://schemas.openxmlformats.org/officeDocument/2006/relationships" xmlns:p1510="http://schemas.microsoft.com/office/powerpoint/2015/10/main">
   <p1510:revLst>
-    <p1510:client id="{49F34664-7160-0641-B67E-AF1F3759D0F2}" v="10" dt="2022-05-29T19:02:05.355"/>
+    <p1510:client id="{BF24E59B-27DE-574A-A985-0D9CC58C4A80}" v="2" dt="2022-07-26T02:32:32.463"/>
   </p1510:revLst>
 </p1510:revInfo>
 </file>
@@ -258,6 +258,38 @@
       </pc:sldChg>
     </pc:docChg>
   </pc:docChgLst>
+  <pc:docChgLst>
+    <pc:chgData name="Trainer, Jackson T" userId="5c586c50-e97e-48e7-9e83-8cb7c8eb6007" providerId="ADAL" clId="{BF24E59B-27DE-574A-A985-0D9CC58C4A80}"/>
+    <pc:docChg chg="undo custSel modSld">
+      <pc:chgData name="Trainer, Jackson T" userId="5c586c50-e97e-48e7-9e83-8cb7c8eb6007" providerId="ADAL" clId="{BF24E59B-27DE-574A-A985-0D9CC58C4A80}" dt="2022-07-26T02:33:20.338" v="32" actId="27636"/>
+      <pc:docMkLst>
+        <pc:docMk/>
+      </pc:docMkLst>
+      <pc:sldChg chg="modSp mod">
+        <pc:chgData name="Trainer, Jackson T" userId="5c586c50-e97e-48e7-9e83-8cb7c8eb6007" providerId="ADAL" clId="{BF24E59B-27DE-574A-A985-0D9CC58C4A80}" dt="2022-07-26T02:33:20.338" v="32" actId="27636"/>
+        <pc:sldMkLst>
+          <pc:docMk/>
+          <pc:sldMk cId="1788910412" sldId="257"/>
+        </pc:sldMkLst>
+        <pc:spChg chg="mod">
+          <ac:chgData name="Trainer, Jackson T" userId="5c586c50-e97e-48e7-9e83-8cb7c8eb6007" providerId="ADAL" clId="{BF24E59B-27DE-574A-A985-0D9CC58C4A80}" dt="2022-07-26T02:33:20.333" v="31" actId="27636"/>
+          <ac:spMkLst>
+            <pc:docMk/>
+            <pc:sldMk cId="1788910412" sldId="257"/>
+            <ac:spMk id="3" creationId="{811A2967-81FD-40FD-E70D-6C4032B5BC3C}"/>
+          </ac:spMkLst>
+        </pc:spChg>
+        <pc:spChg chg="mod">
+          <ac:chgData name="Trainer, Jackson T" userId="5c586c50-e97e-48e7-9e83-8cb7c8eb6007" providerId="ADAL" clId="{BF24E59B-27DE-574A-A985-0D9CC58C4A80}" dt="2022-07-26T02:33:20.338" v="32" actId="27636"/>
+          <ac:spMkLst>
+            <pc:docMk/>
+            <pc:sldMk cId="1788910412" sldId="257"/>
+            <ac:spMk id="4" creationId="{9D4C7B24-1618-4B54-70D8-36E5B2EF5B54}"/>
+          </ac:spMkLst>
+        </pc:spChg>
+      </pc:sldChg>
+    </pc:docChg>
+  </pc:docChgLst>
 </pc:chgInfo>
 </file>
 
@@ -408,7 +440,7 @@
           <a:p>
             <a:fld id="{BC7C149F-317C-154A-B9E4-397A26E1D853}" type="datetimeFigureOut">
               <a:rPr lang="en-US" smtClean="0"/>
-              <a:t>5/29/22</a:t>
+              <a:t>7/25/22</a:t>
             </a:fld>
             <a:endParaRPr lang="en-US"/>
           </a:p>
@@ -606,7 +638,7 @@
           <a:p>
             <a:fld id="{BC7C149F-317C-154A-B9E4-397A26E1D853}" type="datetimeFigureOut">
               <a:rPr lang="en-US" smtClean="0"/>
-              <a:t>5/29/22</a:t>
+              <a:t>7/25/22</a:t>
             </a:fld>
             <a:endParaRPr lang="en-US"/>
           </a:p>
@@ -814,7 +846,7 @@
           <a:p>
             <a:fld id="{BC7C149F-317C-154A-B9E4-397A26E1D853}" type="datetimeFigureOut">
               <a:rPr lang="en-US" smtClean="0"/>
-              <a:t>5/29/22</a:t>
+              <a:t>7/25/22</a:t>
             </a:fld>
             <a:endParaRPr lang="en-US"/>
           </a:p>
@@ -1012,7 +1044,7 @@
           <a:p>
             <a:fld id="{BC7C149F-317C-154A-B9E4-397A26E1D853}" type="datetimeFigureOut">
               <a:rPr lang="en-US" smtClean="0"/>
-              <a:t>5/29/22</a:t>
+              <a:t>7/25/22</a:t>
             </a:fld>
             <a:endParaRPr lang="en-US"/>
           </a:p>
@@ -1287,7 +1319,7 @@
           <a:p>
             <a:fld id="{BC7C149F-317C-154A-B9E4-397A26E1D853}" type="datetimeFigureOut">
               <a:rPr lang="en-US" smtClean="0"/>
-              <a:t>5/29/22</a:t>
+              <a:t>7/25/22</a:t>
             </a:fld>
             <a:endParaRPr lang="en-US"/>
           </a:p>
@@ -1552,7 +1584,7 @@
           <a:p>
             <a:fld id="{BC7C149F-317C-154A-B9E4-397A26E1D853}" type="datetimeFigureOut">
               <a:rPr lang="en-US" smtClean="0"/>
-              <a:t>5/29/22</a:t>
+              <a:t>7/25/22</a:t>
             </a:fld>
             <a:endParaRPr lang="en-US"/>
           </a:p>
@@ -1964,7 +1996,7 @@
           <a:p>
             <a:fld id="{BC7C149F-317C-154A-B9E4-397A26E1D853}" type="datetimeFigureOut">
               <a:rPr lang="en-US" smtClean="0"/>
-              <a:t>5/29/22</a:t>
+              <a:t>7/25/22</a:t>
             </a:fld>
             <a:endParaRPr lang="en-US"/>
           </a:p>
@@ -2105,7 +2137,7 @@
           <a:p>
             <a:fld id="{BC7C149F-317C-154A-B9E4-397A26E1D853}" type="datetimeFigureOut">
               <a:rPr lang="en-US" smtClean="0"/>
-              <a:t>5/29/22</a:t>
+              <a:t>7/25/22</a:t>
             </a:fld>
             <a:endParaRPr lang="en-US"/>
           </a:p>
@@ -2218,7 +2250,7 @@
           <a:p>
             <a:fld id="{BC7C149F-317C-154A-B9E4-397A26E1D853}" type="datetimeFigureOut">
               <a:rPr lang="en-US" smtClean="0"/>
-              <a:t>5/29/22</a:t>
+              <a:t>7/25/22</a:t>
             </a:fld>
             <a:endParaRPr lang="en-US"/>
           </a:p>
@@ -2529,7 +2561,7 @@
           <a:p>
             <a:fld id="{BC7C149F-317C-154A-B9E4-397A26E1D853}" type="datetimeFigureOut">
               <a:rPr lang="en-US" smtClean="0"/>
-              <a:t>5/29/22</a:t>
+              <a:t>7/25/22</a:t>
             </a:fld>
             <a:endParaRPr lang="en-US"/>
           </a:p>
@@ -2817,7 +2849,7 @@
           <a:p>
             <a:fld id="{BC7C149F-317C-154A-B9E4-397A26E1D853}" type="datetimeFigureOut">
               <a:rPr lang="en-US" smtClean="0"/>
-              <a:t>5/29/22</a:t>
+              <a:t>7/25/22</a:t>
             </a:fld>
             <a:endParaRPr lang="en-US"/>
           </a:p>
@@ -3058,7 +3090,7 @@
           <a:p>
             <a:fld id="{BC7C149F-317C-154A-B9E4-397A26E1D853}" type="datetimeFigureOut">
               <a:rPr lang="en-US" smtClean="0"/>
-              <a:t>5/29/22</a:t>
+              <a:t>7/25/22</a:t>
             </a:fld>
             <a:endParaRPr lang="en-US"/>
           </a:p>
@@ -3612,7 +3644,7 @@
         <p:spPr/>
         <p:txBody>
           <a:bodyPr>
-            <a:normAutofit lnSpcReduction="10000"/>
+            <a:normAutofit/>
           </a:bodyPr>
           <a:lstStyle/>
           <a:p>
@@ -3681,58 +3713,52 @@
             <a:pPr lvl="2"/>
             <a:r>
               <a:rPr lang="en-US" dirty="0"/>
-              <a:t>Dictionary</a:t>
-            </a:r>
-          </a:p>
-          <a:p>
-            <a:pPr lvl="2"/>
-            <a:r>
-              <a:rPr lang="en-US" dirty="0"/>
-              <a:t>Score keeping</a:t>
-            </a:r>
-          </a:p>
-          <a:p>
-            <a:pPr lvl="2"/>
+              <a:t>Scorekeeping</a:t>
+            </a:r>
+          </a:p>
+        </p:txBody>
+      </p:sp>
+      <p:sp>
+        <p:nvSpPr>
+          <p:cNvPr id="4" name="Content Placeholder 3">
+            <a:extLst>
+              <a:ext uri="{FF2B5EF4-FFF2-40B4-BE49-F238E27FC236}">
+                <a16:creationId xmlns:a16="http://schemas.microsoft.com/office/drawing/2014/main" id="{9D4C7B24-1618-4B54-70D8-36E5B2EF5B54}"/>
+              </a:ext>
+            </a:extLst>
+          </p:cNvPr>
+          <p:cNvSpPr>
+            <a:spLocks noGrp="1"/>
+          </p:cNvSpPr>
+          <p:nvPr>
+            <p:ph sz="half" idx="2"/>
+          </p:nvPr>
+        </p:nvSpPr>
+        <p:spPr/>
+        <p:txBody>
+          <a:bodyPr>
+            <a:normAutofit/>
+          </a:bodyPr>
+          <a:lstStyle/>
+          <a:p>
+            <a:r>
+              <a:rPr lang="en-US"/>
+              <a:t>Stretch goals</a:t>
+            </a:r>
+            <a:endParaRPr lang="en-US" dirty="0"/>
+          </a:p>
+          <a:p>
+            <a:pPr lvl="1"/>
             <a:r>
               <a:rPr lang="en-US" dirty="0"/>
               <a:t>Legal word checking</a:t>
             </a:r>
           </a:p>
-        </p:txBody>
-      </p:sp>
-      <p:sp>
-        <p:nvSpPr>
-          <p:cNvPr id="4" name="Content Placeholder 3">
-            <a:extLst>
-              <a:ext uri="{FF2B5EF4-FFF2-40B4-BE49-F238E27FC236}">
-                <a16:creationId xmlns:a16="http://schemas.microsoft.com/office/drawing/2014/main" id="{9D4C7B24-1618-4B54-70D8-36E5B2EF5B54}"/>
-              </a:ext>
-            </a:extLst>
-          </p:cNvPr>
-          <p:cNvSpPr>
-            <a:spLocks noGrp="1"/>
-          </p:cNvSpPr>
-          <p:nvPr>
-            <p:ph sz="half" idx="2"/>
-          </p:nvPr>
-        </p:nvSpPr>
-        <p:spPr/>
-        <p:txBody>
-          <a:bodyPr>
-            <a:normAutofit lnSpcReduction="10000"/>
-          </a:bodyPr>
-          <a:lstStyle/>
-          <a:p>
+          <a:p>
+            <a:pPr lvl="1"/>
             <a:r>
               <a:rPr lang="en-US" dirty="0"/>
-              <a:t>Stretch goals</a:t>
-            </a:r>
-          </a:p>
-          <a:p>
-            <a:pPr lvl="1"/>
-            <a:r>
-              <a:rPr lang="en-US" dirty="0"/>
-              <a:t>Additional dictionaries</a:t>
+              <a:t>Dictionary</a:t>
             </a:r>
           </a:p>
           <a:p>

</xml_diff>